<commit_message>
releasing last term's exam2
</commit_message>
<xml_diff>
--- a/ClassMaterials/CPSMore1/24-moreCPS.pptx
+++ b/ClassMaterials/CPSMore1/24-moreCPS.pptx
@@ -176,6 +176,29 @@
 
 <file path=ppt/changesInfos/changesInfo1.xml><?xml version="1.0" encoding="utf-8"?>
 <pc:chgInfo xmlns:a="http://schemas.openxmlformats.org/drawingml/2006/main" xmlns:r="http://schemas.openxmlformats.org/officeDocument/2006/relationships" xmlns:ac="http://schemas.microsoft.com/office/drawing/2013/main/command" xmlns:pc="http://schemas.microsoft.com/office/powerpoint/2013/main/command">
+  <pc:docChgLst>
+    <pc:chgData name="Hewner, Mike" userId="7f3f83dd-6dfb-4127-a87f-c1714bd4fac9" providerId="ADAL" clId="{955851E0-5792-4918-843C-F62EA9EBEE1B}"/>
+    <pc:docChg chg="modSld">
+      <pc:chgData name="Hewner, Mike" userId="7f3f83dd-6dfb-4127-a87f-c1714bd4fac9" providerId="ADAL" clId="{955851E0-5792-4918-843C-F62EA9EBEE1B}" dt="2022-01-21T15:49:24.591" v="1" actId="729"/>
+      <pc:docMkLst>
+        <pc:docMk/>
+      </pc:docMkLst>
+      <pc:sldChg chg="mod modShow">
+        <pc:chgData name="Hewner, Mike" userId="7f3f83dd-6dfb-4127-a87f-c1714bd4fac9" providerId="ADAL" clId="{955851E0-5792-4918-843C-F62EA9EBEE1B}" dt="2022-01-21T15:49:24.591" v="1" actId="729"/>
+        <pc:sldMkLst>
+          <pc:docMk/>
+          <pc:sldMk cId="3638107811" sldId="428"/>
+        </pc:sldMkLst>
+      </pc:sldChg>
+      <pc:sldChg chg="mod modShow">
+        <pc:chgData name="Hewner, Mike" userId="7f3f83dd-6dfb-4127-a87f-c1714bd4fac9" providerId="ADAL" clId="{955851E0-5792-4918-843C-F62EA9EBEE1B}" dt="2022-01-21T15:49:11.833" v="0" actId="729"/>
+        <pc:sldMkLst>
+          <pc:docMk/>
+          <pc:sldMk cId="3003259697" sldId="443"/>
+        </pc:sldMkLst>
+      </pc:sldChg>
+    </pc:docChg>
+  </pc:docChgLst>
   <pc:docChgLst>
     <pc:chgData name="Hewner, Mike" userId="7f3f83dd-6dfb-4127-a87f-c1714bd4fac9" providerId="ADAL" clId="{FFA2270F-E62A-4D13-A338-F8F5143CCC33}"/>
     <pc:docChg chg="custSel addSld modSld">
@@ -3329,7 +3352,7 @@
 </file>
 
 <file path=ppt/slides/slide1.xml><?xml version="1.0" encoding="utf-8"?>
-<p:sld xmlns:a="http://schemas.openxmlformats.org/drawingml/2006/main" xmlns:r="http://schemas.openxmlformats.org/officeDocument/2006/relationships" xmlns:p="http://schemas.openxmlformats.org/presentationml/2006/main">
+<p:sld xmlns:a="http://schemas.openxmlformats.org/drawingml/2006/main" xmlns:r="http://schemas.openxmlformats.org/officeDocument/2006/relationships" xmlns:p="http://schemas.openxmlformats.org/presentationml/2006/main" show="0">
   <p:cSld>
     <p:spTree>
       <p:nvGrpSpPr>
@@ -6374,7 +6397,7 @@
 </file>
 
 <file path=ppt/slides/slide4.xml><?xml version="1.0" encoding="utf-8"?>
-<p:sld xmlns:a="http://schemas.openxmlformats.org/drawingml/2006/main" xmlns:r="http://schemas.openxmlformats.org/officeDocument/2006/relationships" xmlns:p="http://schemas.openxmlformats.org/presentationml/2006/main">
+<p:sld xmlns:a="http://schemas.openxmlformats.org/drawingml/2006/main" xmlns:r="http://schemas.openxmlformats.org/officeDocument/2006/relationships" xmlns:p="http://schemas.openxmlformats.org/presentationml/2006/main" show="0">
   <p:cSld>
     <p:spTree>
       <p:nvGrpSpPr>

</xml_diff>